<commit_message>
added a few more images
</commit_message>
<xml_diff>
--- a/images/Arch diagram-MSDN Article.pptx
+++ b/images/Arch diagram-MSDN Article.pptx
@@ -6,6 +6,7 @@
   </p:sldMasterIdLst>
   <p:sldIdLst>
     <p:sldId id="256" r:id="rId2"/>
+    <p:sldId id="257" r:id="rId3"/>
   </p:sldIdLst>
   <p:sldSz cx="12192000" cy="6858000"/>
   <p:notesSz cx="6858000" cy="9144000"/>
@@ -261,7 +262,7 @@
           <a:p>
             <a:fld id="{2B7C0AC5-94F1-419B-A0DC-D0AF0C8DAD3A}" type="datetimeFigureOut">
               <a:rPr lang="en-IN" smtClean="0"/>
-              <a:t>08-11-2018</a:t>
+              <a:t>09-11-2018</a:t>
             </a:fld>
             <a:endParaRPr lang="en-IN"/>
           </a:p>
@@ -461,7 +462,7 @@
           <a:p>
             <a:fld id="{2B7C0AC5-94F1-419B-A0DC-D0AF0C8DAD3A}" type="datetimeFigureOut">
               <a:rPr lang="en-IN" smtClean="0"/>
-              <a:t>08-11-2018</a:t>
+              <a:t>09-11-2018</a:t>
             </a:fld>
             <a:endParaRPr lang="en-IN"/>
           </a:p>
@@ -671,7 +672,7 @@
           <a:p>
             <a:fld id="{2B7C0AC5-94F1-419B-A0DC-D0AF0C8DAD3A}" type="datetimeFigureOut">
               <a:rPr lang="en-IN" smtClean="0"/>
-              <a:t>08-11-2018</a:t>
+              <a:t>09-11-2018</a:t>
             </a:fld>
             <a:endParaRPr lang="en-IN"/>
           </a:p>
@@ -871,7 +872,7 @@
           <a:p>
             <a:fld id="{2B7C0AC5-94F1-419B-A0DC-D0AF0C8DAD3A}" type="datetimeFigureOut">
               <a:rPr lang="en-IN" smtClean="0"/>
-              <a:t>08-11-2018</a:t>
+              <a:t>09-11-2018</a:t>
             </a:fld>
             <a:endParaRPr lang="en-IN"/>
           </a:p>
@@ -1147,7 +1148,7 @@
           <a:p>
             <a:fld id="{2B7C0AC5-94F1-419B-A0DC-D0AF0C8DAD3A}" type="datetimeFigureOut">
               <a:rPr lang="en-IN" smtClean="0"/>
-              <a:t>08-11-2018</a:t>
+              <a:t>09-11-2018</a:t>
             </a:fld>
             <a:endParaRPr lang="en-IN"/>
           </a:p>
@@ -1415,7 +1416,7 @@
           <a:p>
             <a:fld id="{2B7C0AC5-94F1-419B-A0DC-D0AF0C8DAD3A}" type="datetimeFigureOut">
               <a:rPr lang="en-IN" smtClean="0"/>
-              <a:t>08-11-2018</a:t>
+              <a:t>09-11-2018</a:t>
             </a:fld>
             <a:endParaRPr lang="en-IN"/>
           </a:p>
@@ -1830,7 +1831,7 @@
           <a:p>
             <a:fld id="{2B7C0AC5-94F1-419B-A0DC-D0AF0C8DAD3A}" type="datetimeFigureOut">
               <a:rPr lang="en-IN" smtClean="0"/>
-              <a:t>08-11-2018</a:t>
+              <a:t>09-11-2018</a:t>
             </a:fld>
             <a:endParaRPr lang="en-IN"/>
           </a:p>
@@ -1972,7 +1973,7 @@
           <a:p>
             <a:fld id="{2B7C0AC5-94F1-419B-A0DC-D0AF0C8DAD3A}" type="datetimeFigureOut">
               <a:rPr lang="en-IN" smtClean="0"/>
-              <a:t>08-11-2018</a:t>
+              <a:t>09-11-2018</a:t>
             </a:fld>
             <a:endParaRPr lang="en-IN"/>
           </a:p>
@@ -2085,7 +2086,7 @@
           <a:p>
             <a:fld id="{2B7C0AC5-94F1-419B-A0DC-D0AF0C8DAD3A}" type="datetimeFigureOut">
               <a:rPr lang="en-IN" smtClean="0"/>
-              <a:t>08-11-2018</a:t>
+              <a:t>09-11-2018</a:t>
             </a:fld>
             <a:endParaRPr lang="en-IN"/>
           </a:p>
@@ -2398,7 +2399,7 @@
           <a:p>
             <a:fld id="{2B7C0AC5-94F1-419B-A0DC-D0AF0C8DAD3A}" type="datetimeFigureOut">
               <a:rPr lang="en-IN" smtClean="0"/>
-              <a:t>08-11-2018</a:t>
+              <a:t>09-11-2018</a:t>
             </a:fld>
             <a:endParaRPr lang="en-IN"/>
           </a:p>
@@ -2687,7 +2688,7 @@
           <a:p>
             <a:fld id="{2B7C0AC5-94F1-419B-A0DC-D0AF0C8DAD3A}" type="datetimeFigureOut">
               <a:rPr lang="en-IN" smtClean="0"/>
-              <a:t>08-11-2018</a:t>
+              <a:t>09-11-2018</a:t>
             </a:fld>
             <a:endParaRPr lang="en-IN"/>
           </a:p>
@@ -2930,7 +2931,7 @@
           <a:p>
             <a:fld id="{2B7C0AC5-94F1-419B-A0DC-D0AF0C8DAD3A}" type="datetimeFigureOut">
               <a:rPr lang="en-IN" smtClean="0"/>
-              <a:t>08-11-2018</a:t>
+              <a:t>09-11-2018</a:t>
             </a:fld>
             <a:endParaRPr lang="en-IN"/>
           </a:p>
@@ -7190,6 +7191,141 @@
 </p:sld>
 </file>
 
+<file path=ppt/slides/slide2.xml><?xml version="1.0" encoding="utf-8"?>
+<p:sld xmlns:a="http://schemas.openxmlformats.org/drawingml/2006/main" xmlns:r="http://schemas.openxmlformats.org/officeDocument/2006/relationships" xmlns:p="http://schemas.openxmlformats.org/presentationml/2006/main">
+  <p:cSld>
+    <p:spTree>
+      <p:nvGrpSpPr>
+        <p:cNvPr id="1" name=""/>
+        <p:cNvGrpSpPr/>
+        <p:nvPr/>
+      </p:nvGrpSpPr>
+      <p:grpSpPr>
+        <a:xfrm>
+          <a:off x="0" y="0"/>
+          <a:ext cx="0" cy="0"/>
+          <a:chOff x="0" y="0"/>
+          <a:chExt cx="0" cy="0"/>
+        </a:xfrm>
+      </p:grpSpPr>
+      <p:pic>
+        <p:nvPicPr>
+          <p:cNvPr id="5" name="Picture 4">
+            <a:extLst>
+              <a:ext uri="{FF2B5EF4-FFF2-40B4-BE49-F238E27FC236}">
+                <a16:creationId xmlns:a16="http://schemas.microsoft.com/office/drawing/2014/main" id="{BC1B3303-A0FA-44E1-B443-7B842E95993C}"/>
+              </a:ext>
+            </a:extLst>
+          </p:cNvPr>
+          <p:cNvPicPr>
+            <a:picLocks noChangeAspect="1"/>
+          </p:cNvPicPr>
+          <p:nvPr/>
+        </p:nvPicPr>
+        <p:blipFill>
+          <a:blip r:embed="rId2"/>
+          <a:stretch>
+            <a:fillRect/>
+          </a:stretch>
+        </p:blipFill>
+        <p:spPr>
+          <a:xfrm>
+            <a:off x="98021" y="101019"/>
+            <a:ext cx="3753543" cy="3059760"/>
+          </a:xfrm>
+          <a:prstGeom prst="rect">
+            <a:avLst/>
+          </a:prstGeom>
+          <a:ln>
+            <a:solidFill>
+              <a:schemeClr val="accent1"/>
+            </a:solidFill>
+          </a:ln>
+        </p:spPr>
+      </p:pic>
+      <p:pic>
+        <p:nvPicPr>
+          <p:cNvPr id="8" name="Picture 7">
+            <a:extLst>
+              <a:ext uri="{FF2B5EF4-FFF2-40B4-BE49-F238E27FC236}">
+                <a16:creationId xmlns:a16="http://schemas.microsoft.com/office/drawing/2014/main" id="{DCBFA4D8-8395-4A1A-8951-1182A69407FB}"/>
+              </a:ext>
+            </a:extLst>
+          </p:cNvPr>
+          <p:cNvPicPr>
+            <a:picLocks noChangeAspect="1"/>
+          </p:cNvPicPr>
+          <p:nvPr/>
+        </p:nvPicPr>
+        <p:blipFill>
+          <a:blip r:embed="rId3"/>
+          <a:stretch>
+            <a:fillRect/>
+          </a:stretch>
+        </p:blipFill>
+        <p:spPr>
+          <a:xfrm>
+            <a:off x="3945773" y="101460"/>
+            <a:ext cx="3561405" cy="3059320"/>
+          </a:xfrm>
+          <a:prstGeom prst="rect">
+            <a:avLst/>
+          </a:prstGeom>
+          <a:ln>
+            <a:solidFill>
+              <a:schemeClr val="accent1"/>
+            </a:solidFill>
+          </a:ln>
+        </p:spPr>
+      </p:pic>
+      <p:pic>
+        <p:nvPicPr>
+          <p:cNvPr id="10" name="Picture 9">
+            <a:extLst>
+              <a:ext uri="{FF2B5EF4-FFF2-40B4-BE49-F238E27FC236}">
+                <a16:creationId xmlns:a16="http://schemas.microsoft.com/office/drawing/2014/main" id="{E2E848C4-B101-4ED1-B125-02A41E606BD7}"/>
+              </a:ext>
+            </a:extLst>
+          </p:cNvPr>
+          <p:cNvPicPr>
+            <a:picLocks noChangeAspect="1"/>
+          </p:cNvPicPr>
+          <p:nvPr/>
+        </p:nvPicPr>
+        <p:blipFill>
+          <a:blip r:embed="rId4"/>
+          <a:stretch>
+            <a:fillRect/>
+          </a:stretch>
+        </p:blipFill>
+        <p:spPr>
+          <a:xfrm>
+            <a:off x="98021" y="3235996"/>
+            <a:ext cx="7409157" cy="3535824"/>
+          </a:xfrm>
+          <a:prstGeom prst="rect">
+            <a:avLst/>
+          </a:prstGeom>
+          <a:ln>
+            <a:solidFill>
+              <a:schemeClr val="accent1"/>
+            </a:solidFill>
+          </a:ln>
+        </p:spPr>
+      </p:pic>
+    </p:spTree>
+    <p:extLst>
+      <p:ext uri="{BB962C8B-B14F-4D97-AF65-F5344CB8AC3E}">
+        <p14:creationId xmlns:p14="http://schemas.microsoft.com/office/powerpoint/2010/main" val="837677932"/>
+      </p:ext>
+    </p:extLst>
+  </p:cSld>
+  <p:clrMapOvr>
+    <a:masterClrMapping/>
+  </p:clrMapOvr>
+</p:sld>
+</file>
+
 <file path=ppt/theme/theme1.xml><?xml version="1.0" encoding="utf-8"?>
 <a:theme xmlns:a="http://schemas.openxmlformats.org/drawingml/2006/main" name="Office Theme">
   <a:themeElements>

</xml_diff>

<commit_message>
minor changes to images:wq
</commit_message>
<xml_diff>
--- a/images/Arch diagram-MSDN Article.pptx
+++ b/images/Arch diagram-MSDN Article.pptx
@@ -4984,7 +4984,7 @@
         </p:nvSpPr>
         <p:spPr>
           <a:xfrm>
-            <a:off x="4582923" y="3570737"/>
+            <a:off x="5492824" y="3580449"/>
             <a:ext cx="677708" cy="430887"/>
           </a:xfrm>
           <a:prstGeom prst="rect">
@@ -7178,6 +7178,177 @@
           </a:p>
         </p:txBody>
       </p:sp>
+      <p:pic>
+        <p:nvPicPr>
+          <p:cNvPr id="78" name="Picture 77">
+            <a:extLst>
+              <a:ext uri="{FF2B5EF4-FFF2-40B4-BE49-F238E27FC236}">
+                <a16:creationId xmlns:a16="http://schemas.microsoft.com/office/drawing/2014/main" id="{D8B2582B-5003-45C9-9B36-C2DA93093BA0}"/>
+              </a:ext>
+            </a:extLst>
+          </p:cNvPr>
+          <p:cNvPicPr>
+            <a:picLocks noChangeAspect="1"/>
+          </p:cNvPicPr>
+          <p:nvPr/>
+        </p:nvPicPr>
+        <p:blipFill>
+          <a:blip r:embed="rId11"/>
+          <a:stretch>
+            <a:fillRect/>
+          </a:stretch>
+        </p:blipFill>
+        <p:spPr>
+          <a:xfrm>
+            <a:off x="3268350" y="3196763"/>
+            <a:ext cx="324205" cy="234101"/>
+          </a:xfrm>
+          <a:prstGeom prst="rect">
+            <a:avLst/>
+          </a:prstGeom>
+          <a:noFill/>
+        </p:spPr>
+      </p:pic>
+      <p:pic>
+        <p:nvPicPr>
+          <p:cNvPr id="80" name="Picture 79">
+            <a:extLst>
+              <a:ext uri="{FF2B5EF4-FFF2-40B4-BE49-F238E27FC236}">
+                <a16:creationId xmlns:a16="http://schemas.microsoft.com/office/drawing/2014/main" id="{752299C9-C912-46EE-82AC-07866C1F33FB}"/>
+              </a:ext>
+            </a:extLst>
+          </p:cNvPr>
+          <p:cNvPicPr>
+            <a:picLocks noChangeAspect="1"/>
+          </p:cNvPicPr>
+          <p:nvPr/>
+        </p:nvPicPr>
+        <p:blipFill>
+          <a:blip r:embed="rId11"/>
+          <a:stretch>
+            <a:fillRect/>
+          </a:stretch>
+        </p:blipFill>
+        <p:spPr>
+          <a:xfrm>
+            <a:off x="7294485" y="3226364"/>
+            <a:ext cx="324205" cy="234101"/>
+          </a:xfrm>
+          <a:prstGeom prst="rect">
+            <a:avLst/>
+          </a:prstGeom>
+          <a:noFill/>
+        </p:spPr>
+      </p:pic>
+      <p:pic>
+        <p:nvPicPr>
+          <p:cNvPr id="2" name="Picture 1">
+            <a:extLst>
+              <a:ext uri="{FF2B5EF4-FFF2-40B4-BE49-F238E27FC236}">
+                <a16:creationId xmlns:a16="http://schemas.microsoft.com/office/drawing/2014/main" id="{F3F1AD0D-A538-44F7-AD02-17BFCD4E0AD6}"/>
+              </a:ext>
+            </a:extLst>
+          </p:cNvPr>
+          <p:cNvPicPr>
+            <a:picLocks noChangeAspect="1"/>
+          </p:cNvPicPr>
+          <p:nvPr/>
+        </p:nvPicPr>
+        <p:blipFill>
+          <a:blip r:embed="rId12"/>
+          <a:stretch>
+            <a:fillRect/>
+          </a:stretch>
+        </p:blipFill>
+        <p:spPr>
+          <a:xfrm>
+            <a:off x="4221119" y="3608998"/>
+            <a:ext cx="374474" cy="339800"/>
+          </a:xfrm>
+          <a:prstGeom prst="rect">
+            <a:avLst/>
+          </a:prstGeom>
+        </p:spPr>
+      </p:pic>
+      <p:sp>
+        <p:nvSpPr>
+          <p:cNvPr id="81" name="TextBox 80">
+            <a:extLst>
+              <a:ext uri="{FF2B5EF4-FFF2-40B4-BE49-F238E27FC236}">
+                <a16:creationId xmlns:a16="http://schemas.microsoft.com/office/drawing/2014/main" id="{5E7C62F3-D20E-4A97-A4A4-7BC6965195EE}"/>
+              </a:ext>
+            </a:extLst>
+          </p:cNvPr>
+          <p:cNvSpPr txBox="1"/>
+          <p:nvPr/>
+        </p:nvSpPr>
+        <p:spPr>
+          <a:xfrm>
+            <a:off x="4115926" y="3911036"/>
+            <a:ext cx="594368" cy="430887"/>
+          </a:xfrm>
+          <a:prstGeom prst="rect">
+            <a:avLst/>
+          </a:prstGeom>
+          <a:noFill/>
+        </p:spPr>
+        <p:txBody>
+          <a:bodyPr wrap="square" rtlCol="0">
+            <a:spAutoFit/>
+          </a:bodyPr>
+          <a:lstStyle/>
+          <a:p>
+            <a:r>
+              <a:rPr lang="en-US" sz="1100" dirty="0"/>
+              <a:t>Docker Hub</a:t>
+            </a:r>
+            <a:endParaRPr lang="en-IN" sz="1100" dirty="0"/>
+          </a:p>
+        </p:txBody>
+      </p:sp>
+      <p:cxnSp>
+        <p:nvCxnSpPr>
+          <p:cNvPr id="83" name="Straight Arrow Connector 82">
+            <a:extLst>
+              <a:ext uri="{FF2B5EF4-FFF2-40B4-BE49-F238E27FC236}">
+                <a16:creationId xmlns:a16="http://schemas.microsoft.com/office/drawing/2014/main" id="{6F368E07-9983-40A1-9BD7-7605FF58F4D3}"/>
+              </a:ext>
+            </a:extLst>
+          </p:cNvPr>
+          <p:cNvCxnSpPr>
+            <a:cxnSpLocks/>
+            <a:endCxn id="72" idx="0"/>
+          </p:cNvCxnSpPr>
+          <p:nvPr/>
+        </p:nvCxnSpPr>
+        <p:spPr>
+          <a:xfrm>
+            <a:off x="4644775" y="3818628"/>
+            <a:ext cx="175996" cy="304237"/>
+          </a:xfrm>
+          <a:prstGeom prst="straightConnector1">
+            <a:avLst/>
+          </a:prstGeom>
+          <a:ln>
+            <a:headEnd type="triangle"/>
+            <a:tailEnd type="triangle"/>
+          </a:ln>
+        </p:spPr>
+        <p:style>
+          <a:lnRef idx="1">
+            <a:schemeClr val="accent1"/>
+          </a:lnRef>
+          <a:fillRef idx="0">
+            <a:schemeClr val="accent1"/>
+          </a:fillRef>
+          <a:effectRef idx="0">
+            <a:schemeClr val="accent1"/>
+          </a:effectRef>
+          <a:fontRef idx="minor">
+            <a:schemeClr val="tx1"/>
+          </a:fontRef>
+        </p:style>
+      </p:cxnSp>
     </p:spTree>
     <p:extLst>
       <p:ext uri="{BB962C8B-B14F-4D97-AF65-F5344CB8AC3E}">

</xml_diff>

<commit_message>
removed sensitive info from config
</commit_message>
<xml_diff>
--- a/images/Arch diagram-MSDN Article.pptx
+++ b/images/Arch diagram-MSDN Article.pptx
@@ -262,7 +262,7 @@
           <a:p>
             <a:fld id="{2B7C0AC5-94F1-419B-A0DC-D0AF0C8DAD3A}" type="datetimeFigureOut">
               <a:rPr lang="en-IN" smtClean="0"/>
-              <a:t>09-11-2018</a:t>
+              <a:t>10-11-2018</a:t>
             </a:fld>
             <a:endParaRPr lang="en-IN"/>
           </a:p>
@@ -462,7 +462,7 @@
           <a:p>
             <a:fld id="{2B7C0AC5-94F1-419B-A0DC-D0AF0C8DAD3A}" type="datetimeFigureOut">
               <a:rPr lang="en-IN" smtClean="0"/>
-              <a:t>09-11-2018</a:t>
+              <a:t>10-11-2018</a:t>
             </a:fld>
             <a:endParaRPr lang="en-IN"/>
           </a:p>
@@ -672,7 +672,7 @@
           <a:p>
             <a:fld id="{2B7C0AC5-94F1-419B-A0DC-D0AF0C8DAD3A}" type="datetimeFigureOut">
               <a:rPr lang="en-IN" smtClean="0"/>
-              <a:t>09-11-2018</a:t>
+              <a:t>10-11-2018</a:t>
             </a:fld>
             <a:endParaRPr lang="en-IN"/>
           </a:p>
@@ -872,7 +872,7 @@
           <a:p>
             <a:fld id="{2B7C0AC5-94F1-419B-A0DC-D0AF0C8DAD3A}" type="datetimeFigureOut">
               <a:rPr lang="en-IN" smtClean="0"/>
-              <a:t>09-11-2018</a:t>
+              <a:t>10-11-2018</a:t>
             </a:fld>
             <a:endParaRPr lang="en-IN"/>
           </a:p>
@@ -1148,7 +1148,7 @@
           <a:p>
             <a:fld id="{2B7C0AC5-94F1-419B-A0DC-D0AF0C8DAD3A}" type="datetimeFigureOut">
               <a:rPr lang="en-IN" smtClean="0"/>
-              <a:t>09-11-2018</a:t>
+              <a:t>10-11-2018</a:t>
             </a:fld>
             <a:endParaRPr lang="en-IN"/>
           </a:p>
@@ -1416,7 +1416,7 @@
           <a:p>
             <a:fld id="{2B7C0AC5-94F1-419B-A0DC-D0AF0C8DAD3A}" type="datetimeFigureOut">
               <a:rPr lang="en-IN" smtClean="0"/>
-              <a:t>09-11-2018</a:t>
+              <a:t>10-11-2018</a:t>
             </a:fld>
             <a:endParaRPr lang="en-IN"/>
           </a:p>
@@ -1831,7 +1831,7 @@
           <a:p>
             <a:fld id="{2B7C0AC5-94F1-419B-A0DC-D0AF0C8DAD3A}" type="datetimeFigureOut">
               <a:rPr lang="en-IN" smtClean="0"/>
-              <a:t>09-11-2018</a:t>
+              <a:t>10-11-2018</a:t>
             </a:fld>
             <a:endParaRPr lang="en-IN"/>
           </a:p>
@@ -1973,7 +1973,7 @@
           <a:p>
             <a:fld id="{2B7C0AC5-94F1-419B-A0DC-D0AF0C8DAD3A}" type="datetimeFigureOut">
               <a:rPr lang="en-IN" smtClean="0"/>
-              <a:t>09-11-2018</a:t>
+              <a:t>10-11-2018</a:t>
             </a:fld>
             <a:endParaRPr lang="en-IN"/>
           </a:p>
@@ -2086,7 +2086,7 @@
           <a:p>
             <a:fld id="{2B7C0AC5-94F1-419B-A0DC-D0AF0C8DAD3A}" type="datetimeFigureOut">
               <a:rPr lang="en-IN" smtClean="0"/>
-              <a:t>09-11-2018</a:t>
+              <a:t>10-11-2018</a:t>
             </a:fld>
             <a:endParaRPr lang="en-IN"/>
           </a:p>
@@ -2399,7 +2399,7 @@
           <a:p>
             <a:fld id="{2B7C0AC5-94F1-419B-A0DC-D0AF0C8DAD3A}" type="datetimeFigureOut">
               <a:rPr lang="en-IN" smtClean="0"/>
-              <a:t>09-11-2018</a:t>
+              <a:t>10-11-2018</a:t>
             </a:fld>
             <a:endParaRPr lang="en-IN"/>
           </a:p>
@@ -2688,7 +2688,7 @@
           <a:p>
             <a:fld id="{2B7C0AC5-94F1-419B-A0DC-D0AF0C8DAD3A}" type="datetimeFigureOut">
               <a:rPr lang="en-IN" smtClean="0"/>
-              <a:t>09-11-2018</a:t>
+              <a:t>10-11-2018</a:t>
             </a:fld>
             <a:endParaRPr lang="en-IN"/>
           </a:p>
@@ -2931,7 +2931,7 @@
           <a:p>
             <a:fld id="{2B7C0AC5-94F1-419B-A0DC-D0AF0C8DAD3A}" type="datetimeFigureOut">
               <a:rPr lang="en-IN" smtClean="0"/>
-              <a:t>09-11-2018</a:t>
+              <a:t>10-11-2018</a:t>
             </a:fld>
             <a:endParaRPr lang="en-IN"/>
           </a:p>
@@ -3350,6 +3350,173 @@
       </p:grpSpPr>
       <p:sp>
         <p:nvSpPr>
+          <p:cNvPr id="3" name="Rectangle 2">
+            <a:extLst>
+              <a:ext uri="{FF2B5EF4-FFF2-40B4-BE49-F238E27FC236}">
+                <a16:creationId xmlns:a16="http://schemas.microsoft.com/office/drawing/2014/main" id="{5571C64C-47A2-4CDA-B21C-873C9D78A085}"/>
+              </a:ext>
+            </a:extLst>
+          </p:cNvPr>
+          <p:cNvSpPr/>
+          <p:nvPr/>
+        </p:nvSpPr>
+        <p:spPr>
+          <a:xfrm>
+            <a:off x="900113" y="1266825"/>
+            <a:ext cx="9267825" cy="4076930"/>
+          </a:xfrm>
+          <a:prstGeom prst="rect">
+            <a:avLst/>
+          </a:prstGeom>
+          <a:solidFill>
+            <a:schemeClr val="bg1"/>
+          </a:solidFill>
+        </p:spPr>
+        <p:style>
+          <a:lnRef idx="2">
+            <a:schemeClr val="accent1">
+              <a:shade val="50000"/>
+            </a:schemeClr>
+          </a:lnRef>
+          <a:fillRef idx="1">
+            <a:schemeClr val="accent1"/>
+          </a:fillRef>
+          <a:effectRef idx="0">
+            <a:schemeClr val="accent1"/>
+          </a:effectRef>
+          <a:fontRef idx="minor">
+            <a:schemeClr val="lt1"/>
+          </a:fontRef>
+        </p:style>
+        <p:txBody>
+          <a:bodyPr rtlCol="0" anchor="ctr"/>
+          <a:lstStyle/>
+          <a:p>
+            <a:pPr algn="ctr"/>
+            <a:endParaRPr lang="en-IN"/>
+          </a:p>
+        </p:txBody>
+      </p:sp>
+      <p:sp>
+        <p:nvSpPr>
+          <p:cNvPr id="85" name="Rectangle 84">
+            <a:extLst>
+              <a:ext uri="{FF2B5EF4-FFF2-40B4-BE49-F238E27FC236}">
+                <a16:creationId xmlns:a16="http://schemas.microsoft.com/office/drawing/2014/main" id="{BCE3E2F3-F2DF-4042-AC19-55B3841653E4}"/>
+              </a:ext>
+            </a:extLst>
+          </p:cNvPr>
+          <p:cNvSpPr/>
+          <p:nvPr/>
+        </p:nvSpPr>
+        <p:spPr>
+          <a:xfrm>
+            <a:off x="5650513" y="2874038"/>
+            <a:ext cx="1615799" cy="585086"/>
+          </a:xfrm>
+          <a:prstGeom prst="rect">
+            <a:avLst/>
+          </a:prstGeom>
+          <a:solidFill>
+            <a:schemeClr val="accent3">
+              <a:lumMod val="60000"/>
+              <a:lumOff val="40000"/>
+            </a:schemeClr>
+          </a:solidFill>
+          <a:ln>
+            <a:solidFill>
+              <a:schemeClr val="bg2">
+                <a:lumMod val="75000"/>
+              </a:schemeClr>
+            </a:solidFill>
+          </a:ln>
+        </p:spPr>
+        <p:style>
+          <a:lnRef idx="2">
+            <a:schemeClr val="accent1">
+              <a:shade val="50000"/>
+            </a:schemeClr>
+          </a:lnRef>
+          <a:fillRef idx="1">
+            <a:schemeClr val="accent1"/>
+          </a:fillRef>
+          <a:effectRef idx="0">
+            <a:schemeClr val="accent1"/>
+          </a:effectRef>
+          <a:fontRef idx="minor">
+            <a:schemeClr val="lt1"/>
+          </a:fontRef>
+        </p:style>
+        <p:txBody>
+          <a:bodyPr rtlCol="0" anchor="ctr"/>
+          <a:lstStyle/>
+          <a:p>
+            <a:pPr algn="ctr"/>
+            <a:endParaRPr lang="en-IN"/>
+          </a:p>
+        </p:txBody>
+      </p:sp>
+      <p:sp>
+        <p:nvSpPr>
+          <p:cNvPr id="84" name="Rectangle 83">
+            <a:extLst>
+              <a:ext uri="{FF2B5EF4-FFF2-40B4-BE49-F238E27FC236}">
+                <a16:creationId xmlns:a16="http://schemas.microsoft.com/office/drawing/2014/main" id="{804E82BD-F592-4DB9-946B-D07FAE6F6E57}"/>
+              </a:ext>
+            </a:extLst>
+          </p:cNvPr>
+          <p:cNvSpPr/>
+          <p:nvPr/>
+        </p:nvSpPr>
+        <p:spPr>
+          <a:xfrm>
+            <a:off x="3616439" y="2868889"/>
+            <a:ext cx="1615799" cy="585086"/>
+          </a:xfrm>
+          <a:prstGeom prst="rect">
+            <a:avLst/>
+          </a:prstGeom>
+          <a:solidFill>
+            <a:schemeClr val="accent3">
+              <a:lumMod val="60000"/>
+              <a:lumOff val="40000"/>
+            </a:schemeClr>
+          </a:solidFill>
+          <a:ln>
+            <a:solidFill>
+              <a:schemeClr val="bg2">
+                <a:lumMod val="75000"/>
+              </a:schemeClr>
+            </a:solidFill>
+          </a:ln>
+        </p:spPr>
+        <p:style>
+          <a:lnRef idx="2">
+            <a:schemeClr val="accent1">
+              <a:shade val="50000"/>
+            </a:schemeClr>
+          </a:lnRef>
+          <a:fillRef idx="1">
+            <a:schemeClr val="accent1"/>
+          </a:fillRef>
+          <a:effectRef idx="0">
+            <a:schemeClr val="accent1"/>
+          </a:effectRef>
+          <a:fontRef idx="minor">
+            <a:schemeClr val="lt1"/>
+          </a:fontRef>
+        </p:style>
+        <p:txBody>
+          <a:bodyPr rtlCol="0" anchor="ctr"/>
+          <a:lstStyle/>
+          <a:p>
+            <a:pPr algn="ctr"/>
+            <a:endParaRPr lang="en-IN"/>
+          </a:p>
+        </p:txBody>
+      </p:sp>
+      <p:sp>
+        <p:nvSpPr>
           <p:cNvPr id="170" name="Freeform 128">
             <a:extLst>
               <a:ext uri="{FF2B5EF4-FFF2-40B4-BE49-F238E27FC236}">
@@ -3803,7 +3970,11 @@
             </a:schemeClr>
           </a:solidFill>
           <a:ln>
-            <a:noFill/>
+            <a:solidFill>
+              <a:schemeClr val="bg2">
+                <a:lumMod val="75000"/>
+              </a:schemeClr>
+            </a:solidFill>
           </a:ln>
         </p:spPr>
         <p:style>
@@ -3953,7 +4124,7 @@
         </p:nvSpPr>
         <p:spPr>
           <a:xfrm>
-            <a:off x="2299075" y="4253353"/>
+            <a:off x="2013974" y="4042784"/>
             <a:ext cx="979158" cy="430887"/>
           </a:xfrm>
           <a:prstGeom prst="rect">
@@ -5033,7 +5204,11 @@
             </a:schemeClr>
           </a:solidFill>
           <a:ln>
-            <a:noFill/>
+            <a:solidFill>
+              <a:schemeClr val="bg2">
+                <a:lumMod val="75000"/>
+              </a:schemeClr>
+            </a:solidFill>
           </a:ln>
         </p:spPr>
         <p:style>
@@ -5681,7 +5856,7 @@
         </p:nvSpPr>
         <p:spPr>
           <a:xfrm>
-            <a:off x="7717871" y="4259943"/>
+            <a:off x="7952898" y="4042307"/>
             <a:ext cx="1030144" cy="430887"/>
           </a:xfrm>
           <a:prstGeom prst="rect">
@@ -6026,8 +6201,8 @@
         </p:nvSpPr>
         <p:spPr>
           <a:xfrm>
-            <a:off x="4532022" y="1530322"/>
-            <a:ext cx="622421" cy="430887"/>
+            <a:off x="4493270" y="1446751"/>
+            <a:ext cx="622421" cy="600164"/>
           </a:xfrm>
           <a:prstGeom prst="rect">
             <a:avLst/>
@@ -6042,7 +6217,7 @@
           <a:p>
             <a:r>
               <a:rPr lang="en-US" sz="1100" dirty="0"/>
-              <a:t>Front Door</a:t>
+              <a:t>Azure Front Door</a:t>
             </a:r>
             <a:endParaRPr lang="en-IN" sz="1100" dirty="0"/>
           </a:p>
@@ -7381,10 +7556,10 @@
       </p:grpSpPr>
       <p:pic>
         <p:nvPicPr>
-          <p:cNvPr id="5" name="Picture 4">
-            <a:extLst>
-              <a:ext uri="{FF2B5EF4-FFF2-40B4-BE49-F238E27FC236}">
-                <a16:creationId xmlns:a16="http://schemas.microsoft.com/office/drawing/2014/main" id="{BC1B3303-A0FA-44E1-B443-7B842E95993C}"/>
+          <p:cNvPr id="8" name="Picture 7">
+            <a:extLst>
+              <a:ext uri="{FF2B5EF4-FFF2-40B4-BE49-F238E27FC236}">
+                <a16:creationId xmlns:a16="http://schemas.microsoft.com/office/drawing/2014/main" id="{DCBFA4D8-8395-4A1A-8951-1182A69407FB}"/>
               </a:ext>
             </a:extLst>
           </p:cNvPr>
@@ -7401,8 +7576,8 @@
         </p:blipFill>
         <p:spPr>
           <a:xfrm>
-            <a:off x="98021" y="101019"/>
-            <a:ext cx="3753543" cy="3059760"/>
+            <a:off x="3945773" y="101460"/>
+            <a:ext cx="3561405" cy="3059320"/>
           </a:xfrm>
           <a:prstGeom prst="rect">
             <a:avLst/>
@@ -7416,10 +7591,10 @@
       </p:pic>
       <p:pic>
         <p:nvPicPr>
-          <p:cNvPr id="8" name="Picture 7">
-            <a:extLst>
-              <a:ext uri="{FF2B5EF4-FFF2-40B4-BE49-F238E27FC236}">
-                <a16:creationId xmlns:a16="http://schemas.microsoft.com/office/drawing/2014/main" id="{DCBFA4D8-8395-4A1A-8951-1182A69407FB}"/>
+          <p:cNvPr id="10" name="Picture 9">
+            <a:extLst>
+              <a:ext uri="{FF2B5EF4-FFF2-40B4-BE49-F238E27FC236}">
+                <a16:creationId xmlns:a16="http://schemas.microsoft.com/office/drawing/2014/main" id="{E2E848C4-B101-4ED1-B125-02A41E606BD7}"/>
               </a:ext>
             </a:extLst>
           </p:cNvPr>
@@ -7436,8 +7611,8 @@
         </p:blipFill>
         <p:spPr>
           <a:xfrm>
-            <a:off x="3945773" y="101460"/>
-            <a:ext cx="3561405" cy="3059320"/>
+            <a:off x="98021" y="3235996"/>
+            <a:ext cx="7409157" cy="3535824"/>
           </a:xfrm>
           <a:prstGeom prst="rect">
             <a:avLst/>
@@ -7451,10 +7626,10 @@
       </p:pic>
       <p:pic>
         <p:nvPicPr>
-          <p:cNvPr id="10" name="Picture 9">
-            <a:extLst>
-              <a:ext uri="{FF2B5EF4-FFF2-40B4-BE49-F238E27FC236}">
-                <a16:creationId xmlns:a16="http://schemas.microsoft.com/office/drawing/2014/main" id="{E2E848C4-B101-4ED1-B125-02A41E606BD7}"/>
+          <p:cNvPr id="4" name="Picture 3">
+            <a:extLst>
+              <a:ext uri="{FF2B5EF4-FFF2-40B4-BE49-F238E27FC236}">
+                <a16:creationId xmlns:a16="http://schemas.microsoft.com/office/drawing/2014/main" id="{F5791BC0-8775-458A-B6DA-B6F4C4F04D15}"/>
               </a:ext>
             </a:extLst>
           </p:cNvPr>
@@ -7463,16 +7638,15 @@
           </p:cNvPicPr>
           <p:nvPr/>
         </p:nvPicPr>
-        <p:blipFill>
+        <p:blipFill rotWithShape="1">
           <a:blip r:embed="rId4"/>
-          <a:stretch>
-            <a:fillRect/>
-          </a:stretch>
+          <a:srcRect r="2710"/>
+          <a:stretch/>
         </p:blipFill>
         <p:spPr>
           <a:xfrm>
-            <a:off x="98021" y="3235996"/>
-            <a:ext cx="7409157" cy="3535824"/>
+            <a:off x="98021" y="101461"/>
+            <a:ext cx="3731375" cy="3059320"/>
           </a:xfrm>
           <a:prstGeom prst="rect">
             <a:avLst/>

</xml_diff>